<commit_message>
i #12 Added Final Presentation & Fixed Poster
- Poster had minor grammatical errors that were resolved (missing periods).
- Final presentation .pptx file with its associated .pdf file has been uploaded.
</commit_message>
<xml_diff>
--- a/poster/ICS496-Fall24-FinalPoster.pptx
+++ b/poster/ICS496-Fall24-FinalPoster.pptx
@@ -20456,7 +20456,7 @@
                 <a:cs typeface="Montserrat Light"/>
                 <a:sym typeface="Montserrat Light"/>
               </a:rPr>
-              <a:t>Defining issues and scope according to specifications, and refining solutions through iterative feedback</a:t>
+              <a:t>Defining issues and scope according to specifications, and refining solutions through iterative feedback.</a:t>
             </a:r>
             <a:endParaRPr sz="3300">
               <a:solidFill>
@@ -20516,7 +20516,7 @@
                 <a:cs typeface="Montserrat Light"/>
                 <a:sym typeface="Montserrat Light"/>
               </a:rPr>
-              <a:t>Developing clear and concise documentation, providing guidance to users potentially unfamiliar with the technology</a:t>
+              <a:t>Developing clear and concise documentation, providing guidance to users potentially unfamiliar with the technology.</a:t>
             </a:r>
             <a:endParaRPr sz="3300">
               <a:solidFill>
@@ -21530,7 +21530,7 @@
                 <a:cs typeface="Montserrat Light"/>
                 <a:sym typeface="Montserrat Light"/>
               </a:rPr>
-              <a:t>two mailist list data archives (mod mbox and pipermail).</a:t>
+              <a:t>two mailing list data archives (mod mbox and pipermail).</a:t>
             </a:r>
             <a:endParaRPr sz="3300"/>
           </a:p>
@@ -21864,9 +21864,9 @@
 </file>
 
 <file path=ppt/theme/theme1.xml><?xml version="1.0" encoding="utf-8"?>
-<a:theme xmlns:a="http://schemas.openxmlformats.org/drawingml/2006/main" xmlns:r="http://schemas.openxmlformats.org/officeDocument/2006/relationships">
+<a:theme xmlns:a="http://schemas.openxmlformats.org/drawingml/2006/main" xmlns:r="http://schemas.openxmlformats.org/officeDocument/2006/relationships" name="Blank Presentation">
   <a:themeElements>
-    <a:clrScheme name="Default">
+    <a:clrScheme name="Metro">
       <a:dk1>
         <a:srgbClr val="000000"/>
       </a:dk1>
@@ -21874,34 +21874,34 @@
         <a:srgbClr val="FFFFFF"/>
       </a:lt1>
       <a:dk2>
-        <a:srgbClr val="158158"/>
+        <a:srgbClr val="4E5B6F"/>
       </a:dk2>
       <a:lt2>
-        <a:srgbClr val="F3F3F3"/>
+        <a:srgbClr val="D6ECFF"/>
       </a:lt2>
       <a:accent1>
-        <a:srgbClr val="058DC7"/>
+        <a:srgbClr val="7FD13B"/>
       </a:accent1>
       <a:accent2>
-        <a:srgbClr val="50B432"/>
+        <a:srgbClr val="EA157A"/>
       </a:accent2>
       <a:accent3>
-        <a:srgbClr val="ED561B"/>
+        <a:srgbClr val="FEB80A"/>
       </a:accent3>
       <a:accent4>
-        <a:srgbClr val="EDEF00"/>
+        <a:srgbClr val="00ADDC"/>
       </a:accent4>
       <a:accent5>
-        <a:srgbClr val="24CBE5"/>
+        <a:srgbClr val="738AC8"/>
       </a:accent5>
       <a:accent6>
-        <a:srgbClr val="64E572"/>
+        <a:srgbClr val="1AB39F"/>
       </a:accent6>
       <a:hlink>
-        <a:srgbClr val="2200CC"/>
+        <a:srgbClr val="EB8803"/>
       </a:hlink>
       <a:folHlink>
-        <a:srgbClr val="551A8B"/>
+        <a:srgbClr val="5F7791"/>
       </a:folHlink>
     </a:clrScheme>
     <a:fontScheme name="Office">
@@ -22143,9 +22143,9 @@
 </file>
 
 <file path=ppt/theme/theme2.xml><?xml version="1.0" encoding="utf-8"?>
-<a:theme xmlns:a="http://schemas.openxmlformats.org/drawingml/2006/main" xmlns:r="http://schemas.openxmlformats.org/officeDocument/2006/relationships" name="Blank Presentation">
+<a:theme xmlns:a="http://schemas.openxmlformats.org/drawingml/2006/main" xmlns:r="http://schemas.openxmlformats.org/officeDocument/2006/relationships">
   <a:themeElements>
-    <a:clrScheme name="Metro">
+    <a:clrScheme name="Default">
       <a:dk1>
         <a:srgbClr val="000000"/>
       </a:dk1>
@@ -22153,34 +22153,34 @@
         <a:srgbClr val="FFFFFF"/>
       </a:lt1>
       <a:dk2>
-        <a:srgbClr val="4E5B6F"/>
+        <a:srgbClr val="158158"/>
       </a:dk2>
       <a:lt2>
-        <a:srgbClr val="D6ECFF"/>
+        <a:srgbClr val="F3F3F3"/>
       </a:lt2>
       <a:accent1>
-        <a:srgbClr val="7FD13B"/>
+        <a:srgbClr val="058DC7"/>
       </a:accent1>
       <a:accent2>
-        <a:srgbClr val="EA157A"/>
+        <a:srgbClr val="50B432"/>
       </a:accent2>
       <a:accent3>
-        <a:srgbClr val="FEB80A"/>
+        <a:srgbClr val="ED561B"/>
       </a:accent3>
       <a:accent4>
-        <a:srgbClr val="00ADDC"/>
+        <a:srgbClr val="EDEF00"/>
       </a:accent4>
       <a:accent5>
-        <a:srgbClr val="738AC8"/>
+        <a:srgbClr val="24CBE5"/>
       </a:accent5>
       <a:accent6>
-        <a:srgbClr val="1AB39F"/>
+        <a:srgbClr val="64E572"/>
       </a:accent6>
       <a:hlink>
-        <a:srgbClr val="EB8803"/>
+        <a:srgbClr val="2200CC"/>
       </a:hlink>
       <a:folHlink>
-        <a:srgbClr val="5F7791"/>
+        <a:srgbClr val="551A8B"/>
       </a:folHlink>
     </a:clrScheme>
     <a:fontScheme name="Office">

</xml_diff>